<commit_message>
add pdf version of 635 template
</commit_message>
<xml_diff>
--- a/暑期实习-创新实习/635研讨/635思维分享与整合过程-附件1.pptx
+++ b/暑期实习-创新实习/635研讨/635思维分享与整合过程-附件1.pptx
@@ -304,7 +304,7 @@
           <a:p>
             <a:fld id="{0E681D6B-0EAA-A445-8D26-9C694EDCF7AD}" type="datetimeFigureOut">
               <a:rPr lang="en-US" smtClean="0"/>
-              <a:t>7/28/2014</a:t>
+              <a:t>1/8/2015</a:t>
             </a:fld>
             <a:endParaRPr lang="en-US"/>
           </a:p>
@@ -474,7 +474,7 @@
           <a:p>
             <a:fld id="{0E681D6B-0EAA-A445-8D26-9C694EDCF7AD}" type="datetimeFigureOut">
               <a:rPr lang="en-US" smtClean="0"/>
-              <a:t>7/28/2014</a:t>
+              <a:t>1/8/2015</a:t>
             </a:fld>
             <a:endParaRPr lang="en-US"/>
           </a:p>
@@ -654,7 +654,7 @@
           <a:p>
             <a:fld id="{0E681D6B-0EAA-A445-8D26-9C694EDCF7AD}" type="datetimeFigureOut">
               <a:rPr lang="en-US" smtClean="0"/>
-              <a:t>7/28/2014</a:t>
+              <a:t>1/8/2015</a:t>
             </a:fld>
             <a:endParaRPr lang="en-US"/>
           </a:p>
@@ -824,7 +824,7 @@
           <a:p>
             <a:fld id="{0E681D6B-0EAA-A445-8D26-9C694EDCF7AD}" type="datetimeFigureOut">
               <a:rPr lang="en-US" smtClean="0"/>
-              <a:t>7/28/2014</a:t>
+              <a:t>1/8/2015</a:t>
             </a:fld>
             <a:endParaRPr lang="en-US"/>
           </a:p>
@@ -1070,7 +1070,7 @@
           <a:p>
             <a:fld id="{0E681D6B-0EAA-A445-8D26-9C694EDCF7AD}" type="datetimeFigureOut">
               <a:rPr lang="en-US" smtClean="0"/>
-              <a:t>7/28/2014</a:t>
+              <a:t>1/8/2015</a:t>
             </a:fld>
             <a:endParaRPr lang="en-US"/>
           </a:p>
@@ -1358,7 +1358,7 @@
           <a:p>
             <a:fld id="{0E681D6B-0EAA-A445-8D26-9C694EDCF7AD}" type="datetimeFigureOut">
               <a:rPr lang="en-US" smtClean="0"/>
-              <a:t>7/28/2014</a:t>
+              <a:t>1/8/2015</a:t>
             </a:fld>
             <a:endParaRPr lang="en-US"/>
           </a:p>
@@ -1780,7 +1780,7 @@
           <a:p>
             <a:fld id="{0E681D6B-0EAA-A445-8D26-9C694EDCF7AD}" type="datetimeFigureOut">
               <a:rPr lang="en-US" smtClean="0"/>
-              <a:t>7/28/2014</a:t>
+              <a:t>1/8/2015</a:t>
             </a:fld>
             <a:endParaRPr lang="en-US"/>
           </a:p>
@@ -1898,7 +1898,7 @@
           <a:p>
             <a:fld id="{0E681D6B-0EAA-A445-8D26-9C694EDCF7AD}" type="datetimeFigureOut">
               <a:rPr lang="en-US" smtClean="0"/>
-              <a:t>7/28/2014</a:t>
+              <a:t>1/8/2015</a:t>
             </a:fld>
             <a:endParaRPr lang="en-US"/>
           </a:p>
@@ -1993,7 +1993,7 @@
           <a:p>
             <a:fld id="{0E681D6B-0EAA-A445-8D26-9C694EDCF7AD}" type="datetimeFigureOut">
               <a:rPr lang="en-US" smtClean="0"/>
-              <a:t>7/28/2014</a:t>
+              <a:t>1/8/2015</a:t>
             </a:fld>
             <a:endParaRPr lang="en-US"/>
           </a:p>
@@ -2270,7 +2270,7 @@
           <a:p>
             <a:fld id="{0E681D6B-0EAA-A445-8D26-9C694EDCF7AD}" type="datetimeFigureOut">
               <a:rPr lang="en-US" smtClean="0"/>
-              <a:t>7/28/2014</a:t>
+              <a:t>1/8/2015</a:t>
             </a:fld>
             <a:endParaRPr lang="en-US"/>
           </a:p>
@@ -2523,7 +2523,7 @@
           <a:p>
             <a:fld id="{0E681D6B-0EAA-A445-8D26-9C694EDCF7AD}" type="datetimeFigureOut">
               <a:rPr lang="en-US" smtClean="0"/>
-              <a:t>7/28/2014</a:t>
+              <a:t>1/8/2015</a:t>
             </a:fld>
             <a:endParaRPr lang="en-US"/>
           </a:p>
@@ -2736,7 +2736,7 @@
           <a:p>
             <a:fld id="{0E681D6B-0EAA-A445-8D26-9C694EDCF7AD}" type="datetimeFigureOut">
               <a:rPr lang="en-US" smtClean="0"/>
-              <a:t>7/28/2014</a:t>
+              <a:t>1/8/2015</a:t>
             </a:fld>
             <a:endParaRPr lang="en-US"/>
           </a:p>
@@ -3120,7 +3120,7 @@
         <p:spPr>
           <a:xfrm>
             <a:off x="254192" y="449651"/>
-            <a:ext cx="5955476" cy="646331"/>
+            <a:ext cx="7802136" cy="646331"/>
           </a:xfrm>
           <a:prstGeom prst="rect">
             <a:avLst/>
@@ -3140,6 +3140,22 @@
                 <a:cs typeface="黑体"/>
               </a:rPr>
               <a:t>635</a:t>
+            </a:r>
+            <a:r>
+              <a:rPr lang="zh-CN" altLang="en-US" sz="3600" dirty="0" smtClean="0">
+                <a:latin typeface="黑体"/>
+                <a:ea typeface="黑体"/>
+                <a:cs typeface="黑体"/>
+              </a:rPr>
+              <a:t>方法</a:t>
+            </a:r>
+            <a:r>
+              <a:rPr lang="en-US" altLang="zh-CN" sz="3600" dirty="0" smtClean="0">
+                <a:latin typeface="黑体"/>
+                <a:ea typeface="黑体"/>
+                <a:cs typeface="黑体"/>
+              </a:rPr>
+              <a:t>——</a:t>
             </a:r>
             <a:r>
               <a:rPr lang="zh-CN" altLang="en-US" sz="3600" dirty="0" smtClean="0">

</xml_diff>